<commit_message>
Updating projects to current Unity Version. Updated PPts
</commit_message>
<xml_diff>
--- a/Intro to VR 2 - Hello VR!.pptx
+++ b/Intro to VR 2 - Hello VR!.pptx
@@ -345,7 +345,7 @@
           <a:p>
             <a:fld id="{89495ADB-6615-4FF1-9C17-CDC4DFC30B11}" type="datetimeFigureOut">
               <a:rPr lang="en-US" smtClean="0"/>
-              <a:t>2/11/2019</a:t>
+              <a:t>4/2/2019</a:t>
             </a:fld>
             <a:endParaRPr lang="en-US"/>
           </a:p>
@@ -553,7 +553,7 @@
           <a:p>
             <a:fld id="{89495ADB-6615-4FF1-9C17-CDC4DFC30B11}" type="datetimeFigureOut">
               <a:rPr lang="en-US" smtClean="0"/>
-              <a:t>2/11/2019</a:t>
+              <a:t>4/2/2019</a:t>
             </a:fld>
             <a:endParaRPr lang="en-US"/>
           </a:p>
@@ -809,7 +809,7 @@
           <a:p>
             <a:fld id="{89495ADB-6615-4FF1-9C17-CDC4DFC30B11}" type="datetimeFigureOut">
               <a:rPr lang="en-US" smtClean="0"/>
-              <a:t>2/11/2019</a:t>
+              <a:t>4/2/2019</a:t>
             </a:fld>
             <a:endParaRPr lang="en-US"/>
           </a:p>
@@ -983,7 +983,7 @@
           <a:p>
             <a:fld id="{89495ADB-6615-4FF1-9C17-CDC4DFC30B11}" type="datetimeFigureOut">
               <a:rPr lang="en-US" smtClean="0"/>
-              <a:t>2/11/2019</a:t>
+              <a:t>4/2/2019</a:t>
             </a:fld>
             <a:endParaRPr lang="en-US"/>
           </a:p>
@@ -1326,7 +1326,7 @@
           <a:p>
             <a:fld id="{89495ADB-6615-4FF1-9C17-CDC4DFC30B11}" type="datetimeFigureOut">
               <a:rPr lang="en-US" smtClean="0"/>
-              <a:t>2/11/2019</a:t>
+              <a:t>4/2/2019</a:t>
             </a:fld>
             <a:endParaRPr lang="en-US"/>
           </a:p>
@@ -1601,7 +1601,7 @@
           <a:p>
             <a:fld id="{89495ADB-6615-4FF1-9C17-CDC4DFC30B11}" type="datetimeFigureOut">
               <a:rPr lang="en-US" smtClean="0"/>
-              <a:t>2/11/2019</a:t>
+              <a:t>4/2/2019</a:t>
             </a:fld>
             <a:endParaRPr lang="en-US"/>
           </a:p>
@@ -1980,7 +1980,7 @@
           <a:p>
             <a:fld id="{89495ADB-6615-4FF1-9C17-CDC4DFC30B11}" type="datetimeFigureOut">
               <a:rPr lang="en-US" smtClean="0"/>
-              <a:t>2/11/2019</a:t>
+              <a:t>4/2/2019</a:t>
             </a:fld>
             <a:endParaRPr lang="en-US"/>
           </a:p>
@@ -2098,7 +2098,7 @@
           <a:p>
             <a:fld id="{89495ADB-6615-4FF1-9C17-CDC4DFC30B11}" type="datetimeFigureOut">
               <a:rPr lang="en-US" smtClean="0"/>
-              <a:t>2/11/2019</a:t>
+              <a:t>4/2/2019</a:t>
             </a:fld>
             <a:endParaRPr lang="en-US"/>
           </a:p>
@@ -2269,7 +2269,7 @@
           <a:p>
             <a:fld id="{89495ADB-6615-4FF1-9C17-CDC4DFC30B11}" type="datetimeFigureOut">
               <a:rPr lang="en-US" smtClean="0"/>
-              <a:t>2/11/2019</a:t>
+              <a:t>4/2/2019</a:t>
             </a:fld>
             <a:endParaRPr lang="en-US"/>
           </a:p>
@@ -2623,7 +2623,7 @@
           <a:p>
             <a:fld id="{89495ADB-6615-4FF1-9C17-CDC4DFC30B11}" type="datetimeFigureOut">
               <a:rPr lang="en-US" smtClean="0"/>
-              <a:t>2/11/2019</a:t>
+              <a:t>4/2/2019</a:t>
             </a:fld>
             <a:endParaRPr lang="en-US"/>
           </a:p>
@@ -3005,7 +3005,7 @@
           <a:p>
             <a:fld id="{89495ADB-6615-4FF1-9C17-CDC4DFC30B11}" type="datetimeFigureOut">
               <a:rPr lang="en-US" smtClean="0"/>
-              <a:t>2/11/2019</a:t>
+              <a:t>4/2/2019</a:t>
             </a:fld>
             <a:endParaRPr lang="en-US"/>
           </a:p>
@@ -3292,7 +3292,7 @@
           <a:p>
             <a:fld id="{89495ADB-6615-4FF1-9C17-CDC4DFC30B11}" type="datetimeFigureOut">
               <a:rPr lang="en-US" smtClean="0"/>
-              <a:t>2/11/2019</a:t>
+              <a:t>4/2/2019</a:t>
             </a:fld>
             <a:endParaRPr lang="en-US"/>
           </a:p>
@@ -4268,7 +4268,15 @@
             </a:r>
             <a:r>
               <a:rPr lang="en-US" dirty="0"/>
-              <a:t> / Oculus SDK is listed</a:t>
+              <a:t> is </a:t>
+            </a:r>
+            <a:r>
+              <a:rPr lang="en-US" dirty="0" err="1"/>
+              <a:t>selecte</a:t>
+            </a:r>
+            <a:r>
+              <a:rPr lang="en-US" dirty="0"/>
+              <a:t>. If not, press plus to add them</a:t>
             </a:r>
           </a:p>
           <a:p>
@@ -4278,7 +4286,15 @@
             </a:pPr>
             <a:r>
               <a:rPr lang="en-US" dirty="0"/>
-              <a:t>If not, press plus to add them</a:t>
+              <a:t>If your consoles states </a:t>
+            </a:r>
+            <a:r>
+              <a:rPr lang="en-US" dirty="0" err="1"/>
+              <a:t>OpenVR</a:t>
+            </a:r>
+            <a:r>
+              <a:rPr lang="en-US" dirty="0"/>
+              <a:t> does not exist, remove the SDK and add it again in this menu</a:t>
             </a:r>
           </a:p>
           <a:p>
@@ -4288,15 +4304,7 @@
             </a:pPr>
             <a:r>
               <a:rPr lang="en-US" dirty="0"/>
-              <a:t>If your consoles states </a:t>
-            </a:r>
-            <a:r>
-              <a:rPr lang="en-US" dirty="0" err="1"/>
-              <a:t>OpenVR</a:t>
-            </a:r>
-            <a:r>
-              <a:rPr lang="en-US" dirty="0"/>
-              <a:t> does not exist, remove the SDK and add it again in this menu</a:t>
+              <a:t>If you want to use Oculus specifically, add that SDK now</a:t>
             </a:r>
           </a:p>
         </p:txBody>

</xml_diff>